<commit_message>
High level concept and exemplary details
</commit_message>
<xml_diff>
--- a/spec/Functions/diagrams/CategoriesOfFunctions.pptx
+++ b/spec/Functions/diagrams/CategoriesOfFunctions.pptx
@@ -197,7 +197,7 @@
           <a:p>
             <a:fld id="{37CCF725-7468-4D3D-9E24-A16745BBBA77}" type="datetimeFigureOut">
               <a:rPr lang="de-DE" smtClean="0"/>
-              <a:t>22.07.2025</a:t>
+              <a:t>29.07.2025</a:t>
             </a:fld>
             <a:endParaRPr lang="de-DE"/>
           </a:p>
@@ -595,7 +595,7 @@
           <a:p>
             <a:fld id="{9A2764DB-E7DF-4EA7-A1AF-05A77C280FCA}" type="datetimeFigureOut">
               <a:rPr lang="de-DE" smtClean="0"/>
-              <a:t>22.07.2025</a:t>
+              <a:t>29.07.2025</a:t>
             </a:fld>
             <a:endParaRPr lang="de-DE"/>
           </a:p>
@@ -765,7 +765,7 @@
           <a:p>
             <a:fld id="{9A2764DB-E7DF-4EA7-A1AF-05A77C280FCA}" type="datetimeFigureOut">
               <a:rPr lang="de-DE" smtClean="0"/>
-              <a:t>22.07.2025</a:t>
+              <a:t>29.07.2025</a:t>
             </a:fld>
             <a:endParaRPr lang="de-DE"/>
           </a:p>
@@ -945,7 +945,7 @@
           <a:p>
             <a:fld id="{9A2764DB-E7DF-4EA7-A1AF-05A77C280FCA}" type="datetimeFigureOut">
               <a:rPr lang="de-DE" smtClean="0"/>
-              <a:t>22.07.2025</a:t>
+              <a:t>29.07.2025</a:t>
             </a:fld>
             <a:endParaRPr lang="de-DE"/>
           </a:p>
@@ -1115,7 +1115,7 @@
           <a:p>
             <a:fld id="{9A2764DB-E7DF-4EA7-A1AF-05A77C280FCA}" type="datetimeFigureOut">
               <a:rPr lang="de-DE" smtClean="0"/>
-              <a:t>22.07.2025</a:t>
+              <a:t>29.07.2025</a:t>
             </a:fld>
             <a:endParaRPr lang="de-DE"/>
           </a:p>
@@ -1361,7 +1361,7 @@
           <a:p>
             <a:fld id="{9A2764DB-E7DF-4EA7-A1AF-05A77C280FCA}" type="datetimeFigureOut">
               <a:rPr lang="de-DE" smtClean="0"/>
-              <a:t>22.07.2025</a:t>
+              <a:t>29.07.2025</a:t>
             </a:fld>
             <a:endParaRPr lang="de-DE"/>
           </a:p>
@@ -1593,7 +1593,7 @@
           <a:p>
             <a:fld id="{9A2764DB-E7DF-4EA7-A1AF-05A77C280FCA}" type="datetimeFigureOut">
               <a:rPr lang="de-DE" smtClean="0"/>
-              <a:t>22.07.2025</a:t>
+              <a:t>29.07.2025</a:t>
             </a:fld>
             <a:endParaRPr lang="de-DE"/>
           </a:p>
@@ -1960,7 +1960,7 @@
           <a:p>
             <a:fld id="{9A2764DB-E7DF-4EA7-A1AF-05A77C280FCA}" type="datetimeFigureOut">
               <a:rPr lang="de-DE" smtClean="0"/>
-              <a:t>22.07.2025</a:t>
+              <a:t>29.07.2025</a:t>
             </a:fld>
             <a:endParaRPr lang="de-DE"/>
           </a:p>
@@ -2078,7 +2078,7 @@
           <a:p>
             <a:fld id="{9A2764DB-E7DF-4EA7-A1AF-05A77C280FCA}" type="datetimeFigureOut">
               <a:rPr lang="de-DE" smtClean="0"/>
-              <a:t>22.07.2025</a:t>
+              <a:t>29.07.2025</a:t>
             </a:fld>
             <a:endParaRPr lang="de-DE"/>
           </a:p>
@@ -2173,7 +2173,7 @@
           <a:p>
             <a:fld id="{9A2764DB-E7DF-4EA7-A1AF-05A77C280FCA}" type="datetimeFigureOut">
               <a:rPr lang="de-DE" smtClean="0"/>
-              <a:t>22.07.2025</a:t>
+              <a:t>29.07.2025</a:t>
             </a:fld>
             <a:endParaRPr lang="de-DE"/>
           </a:p>
@@ -2450,7 +2450,7 @@
           <a:p>
             <a:fld id="{9A2764DB-E7DF-4EA7-A1AF-05A77C280FCA}" type="datetimeFigureOut">
               <a:rPr lang="de-DE" smtClean="0"/>
-              <a:t>22.07.2025</a:t>
+              <a:t>29.07.2025</a:t>
             </a:fld>
             <a:endParaRPr lang="de-DE"/>
           </a:p>
@@ -2707,7 +2707,7 @@
           <a:p>
             <a:fld id="{9A2764DB-E7DF-4EA7-A1AF-05A77C280FCA}" type="datetimeFigureOut">
               <a:rPr lang="de-DE" smtClean="0"/>
-              <a:t>22.07.2025</a:t>
+              <a:t>29.07.2025</a:t>
             </a:fld>
             <a:endParaRPr lang="de-DE"/>
           </a:p>
@@ -2920,7 +2920,7 @@
           <a:p>
             <a:fld id="{9A2764DB-E7DF-4EA7-A1AF-05A77C280FCA}" type="datetimeFigureOut">
               <a:rPr lang="de-DE" smtClean="0"/>
-              <a:t>22.07.2025</a:t>
+              <a:t>29.07.2025</a:t>
             </a:fld>
             <a:endParaRPr lang="de-DE"/>
           </a:p>
@@ -3339,7 +3339,7 @@
         </p:nvSpPr>
         <p:spPr>
           <a:xfrm>
-            <a:off x="9760401" y="4320839"/>
+            <a:off x="9747017" y="4349818"/>
             <a:ext cx="12491027" cy="6492304"/>
           </a:xfrm>
           <a:prstGeom prst="rect">
@@ -3780,36 +3780,6 @@
           </a:p>
         </p:txBody>
       </p:sp>
-      <p:pic>
-        <p:nvPicPr>
-          <p:cNvPr id="20" name="Grafik 19">
-            <a:extLst>
-              <a:ext uri="{FF2B5EF4-FFF2-40B4-BE49-F238E27FC236}">
-                <a16:creationId xmlns:a16="http://schemas.microsoft.com/office/drawing/2014/main" id="{BCF78038-D1DC-7915-C516-0912B9772497}"/>
-              </a:ext>
-            </a:extLst>
-          </p:cNvPr>
-          <p:cNvPicPr>
-            <a:picLocks noChangeAspect="1"/>
-          </p:cNvPicPr>
-          <p:nvPr/>
-        </p:nvPicPr>
-        <p:blipFill>
-          <a:blip r:embed="rId2"/>
-          <a:stretch>
-            <a:fillRect/>
-          </a:stretch>
-        </p:blipFill>
-        <p:spPr>
-          <a:xfrm>
-            <a:off x="11781931" y="6156771"/>
-            <a:ext cx="166165" cy="174914"/>
-          </a:xfrm>
-          <a:prstGeom prst="rect">
-            <a:avLst/>
-          </a:prstGeom>
-        </p:spPr>
-      </p:pic>
       <p:sp>
         <p:nvSpPr>
           <p:cNvPr id="2" name="Zylinder 1">
@@ -3929,8 +3899,8 @@
         </p:nvSpPr>
         <p:spPr>
           <a:xfrm>
-            <a:off x="15937846" y="8992374"/>
-            <a:ext cx="1470660" cy="1303020"/>
+            <a:off x="15798782" y="8992374"/>
+            <a:ext cx="1609724" cy="1303020"/>
           </a:xfrm>
           <a:prstGeom prst="verticalScroll">
             <a:avLst/>
@@ -3957,23 +3927,44 @@
           <a:p>
             <a:pPr algn="ctr"/>
             <a:r>
-              <a:rPr lang="de-DE" sz="1200">
+              <a:rPr lang="de-DE" sz="1200" dirty="0" err="1">
                 <a:solidFill>
                   <a:schemeClr val="tx1"/>
                 </a:solidFill>
               </a:rPr>
-              <a:t>AlarmList</a:t>
-            </a:r>
+              <a:t>CurrentAlarms</a:t>
+            </a:r>
+            <a:endParaRPr lang="de-DE" sz="1200" dirty="0">
+              <a:solidFill>
+                <a:schemeClr val="tx1"/>
+              </a:solidFill>
+            </a:endParaRPr>
           </a:p>
           <a:p>
             <a:pPr algn="ctr"/>
             <a:r>
-              <a:rPr lang="de-DE" sz="1200">
+              <a:rPr lang="de-DE" sz="1200" dirty="0">
                 <a:solidFill>
                   <a:schemeClr val="tx1"/>
                 </a:solidFill>
               </a:rPr>
-              <a:t>(ToDo-List)</a:t>
+              <a:t>(</a:t>
+            </a:r>
+            <a:r>
+              <a:rPr lang="de-DE" sz="1200" dirty="0" err="1">
+                <a:solidFill>
+                  <a:schemeClr val="tx1"/>
+                </a:solidFill>
+              </a:rPr>
+              <a:t>ToDo</a:t>
+            </a:r>
+            <a:r>
+              <a:rPr lang="de-DE" sz="1200" dirty="0">
+                <a:solidFill>
+                  <a:schemeClr val="tx1"/>
+                </a:solidFill>
+              </a:rPr>
+              <a:t>-List)</a:t>
             </a:r>
           </a:p>
         </p:txBody>
@@ -4128,36 +4119,6 @@
           </a:p>
         </p:txBody>
       </p:sp>
-      <p:pic>
-        <p:nvPicPr>
-          <p:cNvPr id="14" name="Grafik 13">
-            <a:extLst>
-              <a:ext uri="{FF2B5EF4-FFF2-40B4-BE49-F238E27FC236}">
-                <a16:creationId xmlns:a16="http://schemas.microsoft.com/office/drawing/2014/main" id="{2518E1E4-7D07-0174-BD08-75A840537EA4}"/>
-              </a:ext>
-            </a:extLst>
-          </p:cNvPr>
-          <p:cNvPicPr>
-            <a:picLocks noChangeAspect="1"/>
-          </p:cNvPicPr>
-          <p:nvPr/>
-        </p:nvPicPr>
-        <p:blipFill>
-          <a:blip r:embed="rId2"/>
-          <a:stretch>
-            <a:fillRect/>
-          </a:stretch>
-        </p:blipFill>
-        <p:spPr>
-          <a:xfrm>
-            <a:off x="11957513" y="6396109"/>
-            <a:ext cx="166165" cy="174914"/>
-          </a:xfrm>
-          <a:prstGeom prst="rect">
-            <a:avLst/>
-          </a:prstGeom>
-        </p:spPr>
-      </p:pic>
       <p:cxnSp>
         <p:nvCxnSpPr>
           <p:cNvPr id="16" name="Gerade Verbindung mit Pfeil 15">
@@ -5237,36 +5198,6 @@
           </a:p>
         </p:txBody>
       </p:sp>
-      <p:pic>
-        <p:nvPicPr>
-          <p:cNvPr id="40" name="Grafik 39">
-            <a:extLst>
-              <a:ext uri="{FF2B5EF4-FFF2-40B4-BE49-F238E27FC236}">
-                <a16:creationId xmlns:a16="http://schemas.microsoft.com/office/drawing/2014/main" id="{E09BDAA4-67BB-F896-6F09-0E1F9FBF8A45}"/>
-              </a:ext>
-            </a:extLst>
-          </p:cNvPr>
-          <p:cNvPicPr>
-            <a:picLocks noChangeAspect="1"/>
-          </p:cNvPicPr>
-          <p:nvPr/>
-        </p:nvPicPr>
-        <p:blipFill>
-          <a:blip r:embed="rId2"/>
-          <a:stretch>
-            <a:fillRect/>
-          </a:stretch>
-        </p:blipFill>
-        <p:spPr>
-          <a:xfrm>
-            <a:off x="15749484" y="7820702"/>
-            <a:ext cx="166165" cy="174914"/>
-          </a:xfrm>
-          <a:prstGeom prst="rect">
-            <a:avLst/>
-          </a:prstGeom>
-        </p:spPr>
-      </p:pic>
       <p:sp>
         <p:nvSpPr>
           <p:cNvPr id="41" name="Rechteck 40">
@@ -5317,36 +5248,6 @@
           </a:p>
         </p:txBody>
       </p:sp>
-      <p:pic>
-        <p:nvPicPr>
-          <p:cNvPr id="53" name="Grafik 52">
-            <a:extLst>
-              <a:ext uri="{FF2B5EF4-FFF2-40B4-BE49-F238E27FC236}">
-                <a16:creationId xmlns:a16="http://schemas.microsoft.com/office/drawing/2014/main" id="{121D0D37-DE66-DCCA-16C9-16066F081585}"/>
-              </a:ext>
-            </a:extLst>
-          </p:cNvPr>
-          <p:cNvPicPr>
-            <a:picLocks noChangeAspect="1"/>
-          </p:cNvPicPr>
-          <p:nvPr/>
-        </p:nvPicPr>
-        <p:blipFill>
-          <a:blip r:embed="rId2"/>
-          <a:stretch>
-            <a:fillRect/>
-          </a:stretch>
-        </p:blipFill>
-        <p:spPr>
-          <a:xfrm>
-            <a:off x="15925066" y="8060038"/>
-            <a:ext cx="166165" cy="174914"/>
-          </a:xfrm>
-          <a:prstGeom prst="rect">
-            <a:avLst/>
-          </a:prstGeom>
-        </p:spPr>
-      </p:pic>
       <p:sp>
         <p:nvSpPr>
           <p:cNvPr id="54" name="Rechteck 53">
@@ -5397,36 +5298,6 @@
           </a:p>
         </p:txBody>
       </p:sp>
-      <p:pic>
-        <p:nvPicPr>
-          <p:cNvPr id="60" name="Grafik 59">
-            <a:extLst>
-              <a:ext uri="{FF2B5EF4-FFF2-40B4-BE49-F238E27FC236}">
-                <a16:creationId xmlns:a16="http://schemas.microsoft.com/office/drawing/2014/main" id="{04A1A064-B679-3656-0949-02313E2D7C3A}"/>
-              </a:ext>
-            </a:extLst>
-          </p:cNvPr>
-          <p:cNvPicPr>
-            <a:picLocks noChangeAspect="1"/>
-          </p:cNvPicPr>
-          <p:nvPr/>
-        </p:nvPicPr>
-        <p:blipFill>
-          <a:blip r:embed="rId2"/>
-          <a:stretch>
-            <a:fillRect/>
-          </a:stretch>
-        </p:blipFill>
-        <p:spPr>
-          <a:xfrm>
-            <a:off x="16354805" y="7906088"/>
-            <a:ext cx="166165" cy="174914"/>
-          </a:xfrm>
-          <a:prstGeom prst="rect">
-            <a:avLst/>
-          </a:prstGeom>
-        </p:spPr>
-      </p:pic>
       <p:sp>
         <p:nvSpPr>
           <p:cNvPr id="61" name="Rechteck 60">
@@ -5477,36 +5348,6 @@
           </a:p>
         </p:txBody>
       </p:sp>
-      <p:pic>
-        <p:nvPicPr>
-          <p:cNvPr id="62" name="Grafik 61">
-            <a:extLst>
-              <a:ext uri="{FF2B5EF4-FFF2-40B4-BE49-F238E27FC236}">
-                <a16:creationId xmlns:a16="http://schemas.microsoft.com/office/drawing/2014/main" id="{F7C7F3DD-ECC4-4BD5-0946-1E129614D389}"/>
-              </a:ext>
-            </a:extLst>
-          </p:cNvPr>
-          <p:cNvPicPr>
-            <a:picLocks noChangeAspect="1"/>
-          </p:cNvPicPr>
-          <p:nvPr/>
-        </p:nvPicPr>
-        <p:blipFill>
-          <a:blip r:embed="rId2"/>
-          <a:stretch>
-            <a:fillRect/>
-          </a:stretch>
-        </p:blipFill>
-        <p:spPr>
-          <a:xfrm>
-            <a:off x="16530387" y="8145424"/>
-            <a:ext cx="166165" cy="174914"/>
-          </a:xfrm>
-          <a:prstGeom prst="rect">
-            <a:avLst/>
-          </a:prstGeom>
-        </p:spPr>
-      </p:pic>
       <p:cxnSp>
         <p:nvCxnSpPr>
           <p:cNvPr id="63" name="Gerade Verbindung mit Pfeil 62">
@@ -6243,36 +6084,6 @@
           </a:p>
         </p:txBody>
       </p:sp>
-      <p:pic>
-        <p:nvPicPr>
-          <p:cNvPr id="25" name="Grafik 24">
-            <a:extLst>
-              <a:ext uri="{FF2B5EF4-FFF2-40B4-BE49-F238E27FC236}">
-                <a16:creationId xmlns:a16="http://schemas.microsoft.com/office/drawing/2014/main" id="{28D4D02C-4779-BE26-7C13-5C9A4EE2023A}"/>
-              </a:ext>
-            </a:extLst>
-          </p:cNvPr>
-          <p:cNvPicPr>
-            <a:picLocks noChangeAspect="1"/>
-          </p:cNvPicPr>
-          <p:nvPr/>
-        </p:nvPicPr>
-        <p:blipFill>
-          <a:blip r:embed="rId2"/>
-          <a:stretch>
-            <a:fillRect/>
-          </a:stretch>
-        </p:blipFill>
-        <p:spPr>
-          <a:xfrm>
-            <a:off x="18021404" y="9262517"/>
-            <a:ext cx="166165" cy="174914"/>
-          </a:xfrm>
-          <a:prstGeom prst="rect">
-            <a:avLst/>
-          </a:prstGeom>
-        </p:spPr>
-      </p:pic>
       <p:sp>
         <p:nvSpPr>
           <p:cNvPr id="27" name="Rechteck 26">
@@ -6287,7 +6098,7 @@
         </p:nvSpPr>
         <p:spPr>
           <a:xfrm>
-            <a:off x="18559792" y="7385159"/>
+            <a:off x="16019666" y="5912337"/>
             <a:ext cx="638710" cy="419100"/>
           </a:xfrm>
           <a:prstGeom prst="rect">
@@ -6311,7 +6122,7 @@
           </a:fontRef>
         </p:style>
         <p:txBody>
-          <a:bodyPr rtlCol="0" anchor="t"/>
+          <a:bodyPr rtlCol="0" anchor="ctr"/>
           <a:lstStyle/>
           <a:p>
             <a:pPr algn="r">
@@ -6319,7 +6130,11 @@
                 <a:tab pos="36000" algn="l"/>
               </a:tabLst>
             </a:pPr>
-            <a:endParaRPr lang="de-DE" sz="800"/>
+            <a:r>
+              <a:rPr lang="de-DE" sz="800" dirty="0" err="1"/>
+              <a:t>Pulser</a:t>
+            </a:r>
+            <a:endParaRPr lang="de-DE" sz="800" dirty="0"/>
           </a:p>
         </p:txBody>
       </p:sp>
@@ -6345,7 +6160,7 @@
         </p:blipFill>
         <p:spPr>
           <a:xfrm>
-            <a:off x="18620926" y="7449581"/>
+            <a:off x="16080800" y="5976759"/>
             <a:ext cx="166165" cy="174914"/>
           </a:xfrm>
           <a:prstGeom prst="rect">
@@ -6353,6 +6168,106 @@
           </a:prstGeom>
         </p:spPr>
       </p:pic>
+      <p:sp>
+        <p:nvSpPr>
+          <p:cNvPr id="22" name="Rechteck 21">
+            <a:extLst>
+              <a:ext uri="{FF2B5EF4-FFF2-40B4-BE49-F238E27FC236}">
+                <a16:creationId xmlns:a16="http://schemas.microsoft.com/office/drawing/2014/main" id="{FCAAE95E-A7A7-A0FC-1886-4ED60D60F2F6}"/>
+              </a:ext>
+            </a:extLst>
+          </p:cNvPr>
+          <p:cNvSpPr/>
+          <p:nvPr/>
+        </p:nvSpPr>
+        <p:spPr>
+          <a:xfrm>
+            <a:off x="18501471" y="7361363"/>
+            <a:ext cx="638710" cy="419100"/>
+          </a:xfrm>
+          <a:prstGeom prst="rect">
+            <a:avLst/>
+          </a:prstGeom>
+        </p:spPr>
+        <p:style>
+          <a:lnRef idx="2">
+            <a:schemeClr val="accent1">
+              <a:shade val="15000"/>
+            </a:schemeClr>
+          </a:lnRef>
+          <a:fillRef idx="1">
+            <a:schemeClr val="accent1"/>
+          </a:fillRef>
+          <a:effectRef idx="0">
+            <a:schemeClr val="accent1"/>
+          </a:effectRef>
+          <a:fontRef idx="minor">
+            <a:schemeClr val="lt1"/>
+          </a:fontRef>
+        </p:style>
+        <p:txBody>
+          <a:bodyPr rtlCol="0" anchor="t"/>
+          <a:lstStyle/>
+          <a:p>
+            <a:pPr algn="r">
+              <a:tabLst>
+                <a:tab pos="36000" algn="l"/>
+              </a:tabLst>
+            </a:pPr>
+            <a:endParaRPr lang="de-DE" sz="800"/>
+          </a:p>
+        </p:txBody>
+      </p:sp>
+      <p:sp>
+        <p:nvSpPr>
+          <p:cNvPr id="14" name="Rechteck 13">
+            <a:extLst>
+              <a:ext uri="{FF2B5EF4-FFF2-40B4-BE49-F238E27FC236}">
+                <a16:creationId xmlns:a16="http://schemas.microsoft.com/office/drawing/2014/main" id="{CA312AD2-6C08-50FB-1002-E2B5DAE4DCBA}"/>
+              </a:ext>
+            </a:extLst>
+          </p:cNvPr>
+          <p:cNvSpPr/>
+          <p:nvPr/>
+        </p:nvSpPr>
+        <p:spPr>
+          <a:xfrm>
+            <a:off x="16206785" y="7114221"/>
+            <a:ext cx="638710" cy="419100"/>
+          </a:xfrm>
+          <a:prstGeom prst="rect">
+            <a:avLst/>
+          </a:prstGeom>
+        </p:spPr>
+        <p:style>
+          <a:lnRef idx="2">
+            <a:schemeClr val="accent1">
+              <a:shade val="15000"/>
+            </a:schemeClr>
+          </a:lnRef>
+          <a:fillRef idx="1">
+            <a:schemeClr val="accent1"/>
+          </a:fillRef>
+          <a:effectRef idx="0">
+            <a:schemeClr val="accent1"/>
+          </a:effectRef>
+          <a:fontRef idx="minor">
+            <a:schemeClr val="lt1"/>
+          </a:fontRef>
+        </p:style>
+        <p:txBody>
+          <a:bodyPr rtlCol="0" anchor="t"/>
+          <a:lstStyle/>
+          <a:p>
+            <a:pPr algn="r">
+              <a:tabLst>
+                <a:tab pos="36000" algn="l"/>
+              </a:tabLst>
+            </a:pPr>
+            <a:endParaRPr lang="de-DE" sz="800"/>
+          </a:p>
+        </p:txBody>
+      </p:sp>
     </p:spTree>
     <p:extLst>
       <p:ext uri="{BB962C8B-B14F-4D97-AF65-F5344CB8AC3E}">

</xml_diff>

<commit_message>
Dynamic extension of the waiting time between implementation attempts. Fixes #9
</commit_message>
<xml_diff>
--- a/spec/Functions/diagrams/CategoriesOfFunctions.pptx
+++ b/spec/Functions/diagrams/CategoriesOfFunctions.pptx
@@ -5,10 +5,11 @@
     <p:sldMasterId id="2147483780" r:id="rId1"/>
   </p:sldMasterIdLst>
   <p:notesMasterIdLst>
-    <p:notesMasterId r:id="rId3"/>
+    <p:notesMasterId r:id="rId4"/>
   </p:notesMasterIdLst>
   <p:sldIdLst>
     <p:sldId id="307" r:id="rId2"/>
+    <p:sldId id="308" r:id="rId3"/>
   </p:sldIdLst>
   <p:sldSz cx="35999738" cy="18000663"/>
   <p:notesSz cx="6858000" cy="9144000"/>
@@ -197,7 +198,7 @@
           <a:p>
             <a:fld id="{37CCF725-7468-4D3D-9E24-A16745BBBA77}" type="datetimeFigureOut">
               <a:rPr lang="de-DE" smtClean="0"/>
-              <a:t>29.07.2025</a:t>
+              <a:t>04.08.2025</a:t>
             </a:fld>
             <a:endParaRPr lang="de-DE"/>
           </a:p>
@@ -595,7 +596,7 @@
           <a:p>
             <a:fld id="{9A2764DB-E7DF-4EA7-A1AF-05A77C280FCA}" type="datetimeFigureOut">
               <a:rPr lang="de-DE" smtClean="0"/>
-              <a:t>29.07.2025</a:t>
+              <a:t>04.08.2025</a:t>
             </a:fld>
             <a:endParaRPr lang="de-DE"/>
           </a:p>
@@ -765,7 +766,7 @@
           <a:p>
             <a:fld id="{9A2764DB-E7DF-4EA7-A1AF-05A77C280FCA}" type="datetimeFigureOut">
               <a:rPr lang="de-DE" smtClean="0"/>
-              <a:t>29.07.2025</a:t>
+              <a:t>04.08.2025</a:t>
             </a:fld>
             <a:endParaRPr lang="de-DE"/>
           </a:p>
@@ -945,7 +946,7 @@
           <a:p>
             <a:fld id="{9A2764DB-E7DF-4EA7-A1AF-05A77C280FCA}" type="datetimeFigureOut">
               <a:rPr lang="de-DE" smtClean="0"/>
-              <a:t>29.07.2025</a:t>
+              <a:t>04.08.2025</a:t>
             </a:fld>
             <a:endParaRPr lang="de-DE"/>
           </a:p>
@@ -1115,7 +1116,7 @@
           <a:p>
             <a:fld id="{9A2764DB-E7DF-4EA7-A1AF-05A77C280FCA}" type="datetimeFigureOut">
               <a:rPr lang="de-DE" smtClean="0"/>
-              <a:t>29.07.2025</a:t>
+              <a:t>04.08.2025</a:t>
             </a:fld>
             <a:endParaRPr lang="de-DE"/>
           </a:p>
@@ -1361,7 +1362,7 @@
           <a:p>
             <a:fld id="{9A2764DB-E7DF-4EA7-A1AF-05A77C280FCA}" type="datetimeFigureOut">
               <a:rPr lang="de-DE" smtClean="0"/>
-              <a:t>29.07.2025</a:t>
+              <a:t>04.08.2025</a:t>
             </a:fld>
             <a:endParaRPr lang="de-DE"/>
           </a:p>
@@ -1593,7 +1594,7 @@
           <a:p>
             <a:fld id="{9A2764DB-E7DF-4EA7-A1AF-05A77C280FCA}" type="datetimeFigureOut">
               <a:rPr lang="de-DE" smtClean="0"/>
-              <a:t>29.07.2025</a:t>
+              <a:t>04.08.2025</a:t>
             </a:fld>
             <a:endParaRPr lang="de-DE"/>
           </a:p>
@@ -1960,7 +1961,7 @@
           <a:p>
             <a:fld id="{9A2764DB-E7DF-4EA7-A1AF-05A77C280FCA}" type="datetimeFigureOut">
               <a:rPr lang="de-DE" smtClean="0"/>
-              <a:t>29.07.2025</a:t>
+              <a:t>04.08.2025</a:t>
             </a:fld>
             <a:endParaRPr lang="de-DE"/>
           </a:p>
@@ -2078,7 +2079,7 @@
           <a:p>
             <a:fld id="{9A2764DB-E7DF-4EA7-A1AF-05A77C280FCA}" type="datetimeFigureOut">
               <a:rPr lang="de-DE" smtClean="0"/>
-              <a:t>29.07.2025</a:t>
+              <a:t>04.08.2025</a:t>
             </a:fld>
             <a:endParaRPr lang="de-DE"/>
           </a:p>
@@ -2173,7 +2174,7 @@
           <a:p>
             <a:fld id="{9A2764DB-E7DF-4EA7-A1AF-05A77C280FCA}" type="datetimeFigureOut">
               <a:rPr lang="de-DE" smtClean="0"/>
-              <a:t>29.07.2025</a:t>
+              <a:t>04.08.2025</a:t>
             </a:fld>
             <a:endParaRPr lang="de-DE"/>
           </a:p>
@@ -2450,7 +2451,7 @@
           <a:p>
             <a:fld id="{9A2764DB-E7DF-4EA7-A1AF-05A77C280FCA}" type="datetimeFigureOut">
               <a:rPr lang="de-DE" smtClean="0"/>
-              <a:t>29.07.2025</a:t>
+              <a:t>04.08.2025</a:t>
             </a:fld>
             <a:endParaRPr lang="de-DE"/>
           </a:p>
@@ -2707,7 +2708,7 @@
           <a:p>
             <a:fld id="{9A2764DB-E7DF-4EA7-A1AF-05A77C280FCA}" type="datetimeFigureOut">
               <a:rPr lang="de-DE" smtClean="0"/>
-              <a:t>29.07.2025</a:t>
+              <a:t>04.08.2025</a:t>
             </a:fld>
             <a:endParaRPr lang="de-DE"/>
           </a:p>
@@ -2790,6 +2791,72 @@
           <a:chExt cx="0" cy="0"/>
         </a:xfrm>
       </p:grpSpPr>
+      <p:graphicFrame>
+        <p:nvGraphicFramePr>
+          <p:cNvPr id="8" name="think-cell data - do not delete" hidden="1">
+            <a:extLst>
+              <a:ext uri="{FF2B5EF4-FFF2-40B4-BE49-F238E27FC236}">
+                <a16:creationId xmlns:a16="http://schemas.microsoft.com/office/drawing/2014/main" id="{79651276-3E1D-8A1E-EA69-9668F9010C65}"/>
+              </a:ext>
+            </a:extLst>
+          </p:cNvPr>
+          <p:cNvGraphicFramePr>
+            <a:graphicFrameLocks noChangeAspect="1"/>
+          </p:cNvGraphicFramePr>
+          <p:nvPr userDrawn="1">
+            <p:custDataLst>
+              <p:tags r:id="rId13"/>
+            </p:custDataLst>
+            <p:extLst>
+              <p:ext uri="{D42A27DB-BD31-4B8C-83A1-F6EECF244321}">
+                <p14:modId xmlns:p14="http://schemas.microsoft.com/office/powerpoint/2010/main" val="2799119906"/>
+              </p:ext>
+            </p:extLst>
+          </p:nvPr>
+        </p:nvGraphicFramePr>
+        <p:xfrm>
+          <a:off x="1588" y="1588"/>
+          <a:ext cx="1588" cy="1588"/>
+        </p:xfrm>
+        <a:graphic>
+          <a:graphicData uri="http://schemas.openxmlformats.org/presentationml/2006/ole">
+            <mc:AlternateContent xmlns:mc="http://schemas.openxmlformats.org/markup-compatibility/2006">
+              <mc:Choice xmlns:v="urn:schemas-microsoft-com:vml" Requires="v">
+                <p:oleObj name="think-cell Folie" r:id="rId14" imgW="523" imgH="514" progId="TCLayout.ActiveDocument.1">
+                  <p:embed/>
+                </p:oleObj>
+              </mc:Choice>
+              <mc:Fallback>
+                <p:oleObj name="think-cell Folie" r:id="rId14" imgW="523" imgH="514" progId="TCLayout.ActiveDocument.1">
+                  <p:embed/>
+                  <p:pic>
+                    <p:nvPicPr>
+                      <p:cNvPr id="0" name=""/>
+                      <p:cNvPicPr/>
+                      <p:nvPr/>
+                    </p:nvPicPr>
+                    <p:blipFill>
+                      <a:blip r:embed="rId15"/>
+                      <a:stretch>
+                        <a:fillRect/>
+                      </a:stretch>
+                    </p:blipFill>
+                    <p:spPr>
+                      <a:xfrm>
+                        <a:off x="1588" y="1588"/>
+                        <a:ext cx="1588" cy="1588"/>
+                      </a:xfrm>
+                      <a:prstGeom prst="rect">
+                        <a:avLst/>
+                      </a:prstGeom>
+                    </p:spPr>
+                  </p:pic>
+                </p:oleObj>
+              </mc:Fallback>
+            </mc:AlternateContent>
+          </a:graphicData>
+        </a:graphic>
+      </p:graphicFrame>
       <p:sp>
         <p:nvSpPr>
           <p:cNvPr id="2" name="Title Placeholder 1"/>
@@ -2920,7 +2987,7 @@
           <a:p>
             <a:fld id="{9A2764DB-E7DF-4EA7-A1AF-05A77C280FCA}" type="datetimeFigureOut">
               <a:rPr lang="de-DE" smtClean="0"/>
-              <a:t>29.07.2025</a:t>
+              <a:t>04.08.2025</a:t>
             </a:fld>
             <a:endParaRPr lang="de-DE"/>
           </a:p>
@@ -6279,6 +6346,525 @@
     <a:masterClrMapping/>
   </p:clrMapOvr>
 </p:sld>
+</file>
+
+<file path=ppt/slides/slide2.xml><?xml version="1.0" encoding="utf-8"?>
+<p:sld xmlns:a="http://schemas.openxmlformats.org/drawingml/2006/main" xmlns:r="http://schemas.openxmlformats.org/officeDocument/2006/relationships" xmlns:p="http://schemas.openxmlformats.org/presentationml/2006/main">
+  <p:cSld>
+    <p:spTree>
+      <p:nvGrpSpPr>
+        <p:cNvPr id="1" name=""/>
+        <p:cNvGrpSpPr/>
+        <p:nvPr/>
+      </p:nvGrpSpPr>
+      <p:grpSpPr>
+        <a:xfrm>
+          <a:off x="0" y="0"/>
+          <a:ext cx="0" cy="0"/>
+          <a:chOff x="0" y="0"/>
+          <a:chExt cx="0" cy="0"/>
+        </a:xfrm>
+      </p:grpSpPr>
+      <p:graphicFrame>
+        <p:nvGraphicFramePr>
+          <p:cNvPr id="4" name="think-cell data - do not delete" hidden="1">
+            <a:extLst>
+              <a:ext uri="{FF2B5EF4-FFF2-40B4-BE49-F238E27FC236}">
+                <a16:creationId xmlns:a16="http://schemas.microsoft.com/office/drawing/2014/main" id="{80A39782-9C33-AAEB-8DDB-720A16217B5B}"/>
+              </a:ext>
+            </a:extLst>
+          </p:cNvPr>
+          <p:cNvGraphicFramePr>
+            <a:graphicFrameLocks noChangeAspect="1"/>
+          </p:cNvGraphicFramePr>
+          <p:nvPr>
+            <p:custDataLst>
+              <p:tags r:id="rId1"/>
+            </p:custDataLst>
+            <p:extLst>
+              <p:ext uri="{D42A27DB-BD31-4B8C-83A1-F6EECF244321}">
+                <p14:modId xmlns:p14="http://schemas.microsoft.com/office/powerpoint/2010/main" val="3181116522"/>
+              </p:ext>
+            </p:extLst>
+          </p:nvPr>
+        </p:nvGraphicFramePr>
+        <p:xfrm>
+          <a:off x="1588" y="1588"/>
+          <a:ext cx="1588" cy="1588"/>
+        </p:xfrm>
+        <a:graphic>
+          <a:graphicData uri="http://schemas.openxmlformats.org/presentationml/2006/ole">
+            <mc:AlternateContent xmlns:mc="http://schemas.openxmlformats.org/markup-compatibility/2006">
+              <mc:Choice xmlns:v="urn:schemas-microsoft-com:vml" Requires="v">
+                <p:oleObj name="think-cell Folie" r:id="rId3" imgW="523" imgH="514" progId="TCLayout.ActiveDocument.1">
+                  <p:embed/>
+                </p:oleObj>
+              </mc:Choice>
+              <mc:Fallback>
+                <p:oleObj name="think-cell Folie" r:id="rId3" imgW="523" imgH="514" progId="TCLayout.ActiveDocument.1">
+                  <p:embed/>
+                  <p:pic>
+                    <p:nvPicPr>
+                      <p:cNvPr id="0" name=""/>
+                      <p:cNvPicPr/>
+                      <p:nvPr/>
+                    </p:nvPicPr>
+                    <p:blipFill>
+                      <a:blip r:embed="rId4"/>
+                      <a:stretch>
+                        <a:fillRect/>
+                      </a:stretch>
+                    </p:blipFill>
+                    <p:spPr>
+                      <a:xfrm>
+                        <a:off x="1588" y="1588"/>
+                        <a:ext cx="1588" cy="1588"/>
+                      </a:xfrm>
+                      <a:prstGeom prst="rect">
+                        <a:avLst/>
+                      </a:prstGeom>
+                    </p:spPr>
+                  </p:pic>
+                </p:oleObj>
+              </mc:Fallback>
+            </mc:AlternateContent>
+          </a:graphicData>
+        </a:graphic>
+      </p:graphicFrame>
+      <mc:AlternateContent xmlns:mc="http://schemas.openxmlformats.org/markup-compatibility/2006">
+        <mc:Choice xmlns:a14="http://schemas.microsoft.com/office/drawing/2010/main" Requires="a14">
+          <p:sp>
+            <p:nvSpPr>
+              <p:cNvPr id="5" name="Textfeld 4">
+                <a:extLst>
+                  <a:ext uri="{FF2B5EF4-FFF2-40B4-BE49-F238E27FC236}">
+                    <a16:creationId xmlns:a16="http://schemas.microsoft.com/office/drawing/2014/main" id="{8D08FAB6-C530-9B77-15B5-232C13701B92}"/>
+                  </a:ext>
+                </a:extLst>
+              </p:cNvPr>
+              <p:cNvSpPr txBox="1"/>
+              <p:nvPr/>
+            </p:nvSpPr>
+            <p:spPr>
+              <a:xfrm>
+                <a:off x="14184209" y="7505617"/>
+                <a:ext cx="7046609" cy="197683"/>
+              </a:xfrm>
+              <a:prstGeom prst="rect">
+                <a:avLst/>
+              </a:prstGeom>
+              <a:noFill/>
+            </p:spPr>
+            <p:txBody>
+              <a:bodyPr wrap="none" lIns="0" tIns="0" rIns="0" bIns="0" rtlCol="0">
+                <a:spAutoFit/>
+              </a:bodyPr>
+              <a:lstStyle/>
+              <a:p>
+                <a14:m>
+                  <m:oMathPara xmlns:m="http://schemas.openxmlformats.org/officeDocument/2006/math">
+                    <m:oMathParaPr>
+                      <m:jc m:val="centerGroup"/>
+                    </m:oMathParaPr>
+                    <m:oMath xmlns:m="http://schemas.openxmlformats.org/officeDocument/2006/math">
+                      <m:sSup>
+                        <m:sSupPr>
+                          <m:ctrlPr>
+                            <a:rPr lang="pt-BR" sz="1200" smtClean="0"/>
+                          </m:ctrlPr>
+                        </m:sSupPr>
+                        <m:e>
+                          <m:d>
+                            <m:dPr>
+                              <m:begChr m:val="["/>
+                              <m:endChr m:val="]"/>
+                              <m:ctrlPr>
+                                <a:rPr lang="de-DE" sz="1200"/>
+                              </m:ctrlPr>
+                            </m:dPr>
+                            <m:e>
+                              <m:r>
+                                <m:rPr>
+                                  <m:sty m:val="p"/>
+                                </m:rPr>
+                                <a:rPr lang="pt-BR" sz="1200"/>
+                                <m:t>date</m:t>
+                              </m:r>
+                              <m:r>
+                                <a:rPr lang="pt-BR" sz="1200"/>
+                                <m:t>-</m:t>
+                              </m:r>
+                              <m:r>
+                                <m:rPr>
+                                  <m:sty m:val="p"/>
+                                </m:rPr>
+                                <a:rPr lang="pt-BR" sz="1200"/>
+                                <m:t>of</m:t>
+                              </m:r>
+                              <m:r>
+                                <a:rPr lang="pt-BR" sz="1200"/>
+                                <m:t>-</m:t>
+                              </m:r>
+                              <m:r>
+                                <m:rPr>
+                                  <m:sty m:val="p"/>
+                                </m:rPr>
+                                <a:rPr lang="pt-BR" sz="1200"/>
+                                <m:t>next</m:t>
+                              </m:r>
+                              <m:r>
+                                <a:rPr lang="pt-BR" sz="1200"/>
+                                <m:t>-</m:t>
+                              </m:r>
+                              <m:r>
+                                <m:rPr>
+                                  <m:sty m:val="p"/>
+                                </m:rPr>
+                                <a:rPr lang="pt-BR" sz="1200"/>
+                                <m:t>attempt</m:t>
+                              </m:r>
+                              <m:r>
+                                <a:rPr lang="pt-BR" sz="1200"/>
+                                <m:t>-</m:t>
+                              </m:r>
+                              <m:r>
+                                <m:rPr>
+                                  <m:sty m:val="p"/>
+                                </m:rPr>
+                                <a:rPr lang="pt-BR" sz="1200"/>
+                                <m:t>to</m:t>
+                              </m:r>
+                              <m:r>
+                                <a:rPr lang="pt-BR" sz="1200"/>
+                                <m:t>-</m:t>
+                              </m:r>
+                              <m:r>
+                                <m:rPr>
+                                  <m:sty m:val="p"/>
+                                </m:rPr>
+                                <a:rPr lang="pt-BR" sz="1200"/>
+                                <m:t>fix</m:t>
+                              </m:r>
+                            </m:e>
+                          </m:d>
+                          <m:r>
+                            <a:rPr lang="de-DE" sz="1200"/>
+                            <m:t>=</m:t>
+                          </m:r>
+                          <m:r>
+                            <m:rPr>
+                              <m:sty m:val="p"/>
+                            </m:rPr>
+                            <a:rPr lang="de-DE" sz="1200"/>
+                            <m:t>max</m:t>
+                          </m:r>
+                          <m:r>
+                            <a:rPr lang="de-DE" sz="1200"/>
+                            <m:t>([</m:t>
+                          </m:r>
+                          <m:r>
+                            <m:rPr>
+                              <m:sty m:val="p"/>
+                            </m:rPr>
+                            <a:rPr lang="de-DE" sz="1200"/>
+                            <m:t>date</m:t>
+                          </m:r>
+                          <m:r>
+                            <a:rPr lang="de-DE" sz="1200"/>
+                            <m:t>-</m:t>
+                          </m:r>
+                          <m:r>
+                            <m:rPr>
+                              <m:sty m:val="p"/>
+                            </m:rPr>
+                            <a:rPr lang="de-DE" sz="1200"/>
+                            <m:t>of</m:t>
+                          </m:r>
+                          <m:r>
+                            <a:rPr lang="de-DE" sz="1200"/>
+                            <m:t>-</m:t>
+                          </m:r>
+                          <m:r>
+                            <m:rPr>
+                              <m:sty m:val="p"/>
+                            </m:rPr>
+                            <a:rPr lang="de-DE" sz="1200"/>
+                            <m:t>attempt</m:t>
+                          </m:r>
+                          <m:r>
+                            <a:rPr lang="de-DE" sz="1200" b="0" i="0" smtClean="0"/>
+                            <m:t>]</m:t>
+                          </m:r>
+                          <m:r>
+                            <a:rPr lang="de-DE" sz="1200"/>
+                            <m:t>)</m:t>
+                          </m:r>
+                          <m:r>
+                            <a:rPr lang="de-DE" sz="1200" i="1" smtClean="0"/>
+                            <m:t> </m:t>
+                          </m:r>
+                          <m:r>
+                            <a:rPr lang="de-DE" sz="1200"/>
+                            <m:t>+</m:t>
+                          </m:r>
+                          <m:r>
+                            <m:rPr>
+                              <m:sty m:val="p"/>
+                            </m:rPr>
+                            <a:rPr lang="de-DE" sz="1200"/>
+                            <m:t>min</m:t>
+                          </m:r>
+                          <m:r>
+                            <a:rPr lang="de-DE" sz="1200"/>
+                            <m:t>( [</m:t>
+                          </m:r>
+                          <m:r>
+                            <m:rPr>
+                              <m:sty m:val="p"/>
+                            </m:rPr>
+                            <a:rPr lang="de-DE" sz="1200" b="0" i="0" smtClean="0"/>
+                            <m:t>tmi</m:t>
+                          </m:r>
+                          <m:r>
+                            <m:rPr>
+                              <m:sty m:val="p"/>
+                            </m:rPr>
+                            <a:rPr lang="de-DE" sz="1200" b="0" i="0" baseline="-25000" smtClean="0"/>
+                            <m:t>n</m:t>
+                          </m:r>
+                          <m:r>
+                            <a:rPr lang="de-DE" sz="1200" b="0" i="0" smtClean="0"/>
+                            <m:t>]</m:t>
+                          </m:r>
+                          <m:r>
+                            <a:rPr lang="de-DE" sz="1200"/>
+                            <m:t>∗</m:t>
+                          </m:r>
+                          <m:r>
+                            <a:rPr lang="de-DE" sz="1200"/>
+                            <m:t>2</m:t>
+                          </m:r>
+                        </m:e>
+                        <m:sup>
+                          <m:r>
+                            <m:rPr>
+                              <m:sty m:val="p"/>
+                            </m:rPr>
+                            <a:rPr lang="de-DE" sz="1200"/>
+                            <m:t>count</m:t>
+                          </m:r>
+                          <m:r>
+                            <a:rPr lang="de-DE" sz="1200" b="0" i="0" smtClean="0">
+                              <a:latin typeface="Cambria Math" panose="02040503050406030204" pitchFamily="18" charset="0"/>
+                            </a:rPr>
+                            <m:t>(</m:t>
+                          </m:r>
+                          <m:d>
+                            <m:dPr>
+                              <m:begChr m:val="["/>
+                              <m:endChr m:val="]"/>
+                              <m:ctrlPr>
+                                <a:rPr lang="de-DE" sz="1200" b="0" i="0" smtClean="0">
+                                  <a:latin typeface="Cambria Math" panose="02040503050406030204" pitchFamily="18" charset="0"/>
+                                </a:rPr>
+                              </m:ctrlPr>
+                            </m:dPr>
+                            <m:e>
+                              <m:r>
+                                <m:rPr>
+                                  <m:sty m:val="p"/>
+                                </m:rPr>
+                                <a:rPr lang="de-DE" sz="1200">
+                                  <a:latin typeface="Cambria Math" panose="02040503050406030204" pitchFamily="18" charset="0"/>
+                                </a:rPr>
+                                <m:t>past</m:t>
+                              </m:r>
+                              <m:r>
+                                <a:rPr lang="de-DE" sz="1200">
+                                  <a:latin typeface="Cambria Math" panose="02040503050406030204" pitchFamily="18" charset="0"/>
+                                </a:rPr>
+                                <m:t>-</m:t>
+                              </m:r>
+                              <m:r>
+                                <m:rPr>
+                                  <m:sty m:val="p"/>
+                                </m:rPr>
+                                <a:rPr lang="de-DE" sz="1200">
+                                  <a:latin typeface="Cambria Math" panose="02040503050406030204" pitchFamily="18" charset="0"/>
+                                </a:rPr>
+                                <m:t>attempts</m:t>
+                              </m:r>
+                              <m:r>
+                                <a:rPr lang="de-DE" sz="1200">
+                                  <a:latin typeface="Cambria Math" panose="02040503050406030204" pitchFamily="18" charset="0"/>
+                                </a:rPr>
+                                <m:t>-</m:t>
+                              </m:r>
+                              <m:r>
+                                <m:rPr>
+                                  <m:sty m:val="p"/>
+                                </m:rPr>
+                                <a:rPr lang="de-DE" sz="1200">
+                                  <a:latin typeface="Cambria Math" panose="02040503050406030204" pitchFamily="18" charset="0"/>
+                                </a:rPr>
+                                <m:t>to</m:t>
+                              </m:r>
+                              <m:r>
+                                <a:rPr lang="de-DE" sz="1200">
+                                  <a:latin typeface="Cambria Math" panose="02040503050406030204" pitchFamily="18" charset="0"/>
+                                </a:rPr>
+                                <m:t>-</m:t>
+                              </m:r>
+                              <m:r>
+                                <m:rPr>
+                                  <m:sty m:val="p"/>
+                                </m:rPr>
+                                <a:rPr lang="de-DE" sz="1200">
+                                  <a:latin typeface="Cambria Math" panose="02040503050406030204" pitchFamily="18" charset="0"/>
+                                </a:rPr>
+                                <m:t>fix</m:t>
+                              </m:r>
+                            </m:e>
+                          </m:d>
+                          <m:r>
+                            <a:rPr lang="de-DE" sz="1200" b="0" i="0" smtClean="0">
+                              <a:latin typeface="Cambria Math" panose="02040503050406030204" pitchFamily="18" charset="0"/>
+                            </a:rPr>
+                            <m:t>)</m:t>
+                          </m:r>
+                          <m:r>
+                            <a:rPr lang="de-DE" sz="1200" i="1" smtClean="0"/>
+                            <m:t> </m:t>
+                          </m:r>
+                        </m:sup>
+                      </m:sSup>
+                      <m:r>
+                        <a:rPr lang="de-DE" sz="1200" b="0" i="0" smtClean="0">
+                          <a:latin typeface="Cambria Math" panose="02040503050406030204" pitchFamily="18" charset="0"/>
+                        </a:rPr>
+                        <m:t>;</m:t>
+                      </m:r>
+                      <m:d>
+                        <m:dPr>
+                          <m:begChr m:val="["/>
+                          <m:endChr m:val="]"/>
+                          <m:ctrlPr>
+                            <a:rPr lang="de-DE" sz="1200" b="0" i="0" smtClean="0">
+                              <a:latin typeface="Cambria Math" panose="02040503050406030204" pitchFamily="18" charset="0"/>
+                            </a:rPr>
+                          </m:ctrlPr>
+                        </m:dPr>
+                        <m:e>
+                          <m:r>
+                            <m:rPr>
+                              <m:sty m:val="p"/>
+                            </m:rPr>
+                            <a:rPr lang="de-DE" sz="1200" b="0" i="0" smtClean="0">
+                              <a:latin typeface="Cambria Math" panose="02040503050406030204" pitchFamily="18" charset="0"/>
+                            </a:rPr>
+                            <m:t>t</m:t>
+                          </m:r>
+                          <m:r>
+                            <m:rPr>
+                              <m:sty m:val="p"/>
+                            </m:rPr>
+                            <a:rPr lang="de-DE" sz="1200" b="0" i="0" baseline="-25000" smtClean="0">
+                              <a:latin typeface="Cambria Math" panose="02040503050406030204" pitchFamily="18" charset="0"/>
+                            </a:rPr>
+                            <m:t>max</m:t>
+                          </m:r>
+                        </m:e>
+                      </m:d>
+                      <m:r>
+                        <a:rPr lang="de-DE" sz="1200" b="0" i="0" baseline="-25000" smtClean="0">
+                          <a:latin typeface="Cambria Math" panose="02040503050406030204" pitchFamily="18" charset="0"/>
+                        </a:rPr>
+                        <m:t> </m:t>
+                      </m:r>
+                      <m:r>
+                        <a:rPr lang="de-DE" sz="1200" b="0" i="0" smtClean="0">
+                          <a:latin typeface="Cambria Math" panose="02040503050406030204" pitchFamily="18" charset="0"/>
+                        </a:rPr>
+                        <m:t>)</m:t>
+                      </m:r>
+                    </m:oMath>
+                  </m:oMathPara>
+                </a14:m>
+                <a:endParaRPr lang="de-DE" sz="1200" dirty="0">
+                  <a:cs typeface="Aldhabi" panose="020F0502020204030204" pitchFamily="2" charset="-78"/>
+                </a:endParaRPr>
+              </a:p>
+            </p:txBody>
+          </p:sp>
+        </mc:Choice>
+        <mc:Fallback>
+          <p:sp>
+            <p:nvSpPr>
+              <p:cNvPr id="5" name="Textfeld 4">
+                <a:extLst>
+                  <a:ext uri="{FF2B5EF4-FFF2-40B4-BE49-F238E27FC236}">
+                    <a16:creationId xmlns:a16="http://schemas.microsoft.com/office/drawing/2014/main" id="{8D08FAB6-C530-9B77-15B5-232C13701B92}"/>
+                  </a:ext>
+                </a:extLst>
+              </p:cNvPr>
+              <p:cNvSpPr txBox="1">
+                <a:spLocks noRot="1" noChangeAspect="1" noMove="1" noResize="1" noEditPoints="1" noAdjustHandles="1" noChangeArrowheads="1" noChangeShapeType="1" noTextEdit="1"/>
+              </p:cNvSpPr>
+              <p:nvPr/>
+            </p:nvSpPr>
+            <p:spPr>
+              <a:xfrm>
+                <a:off x="14184209" y="7505617"/>
+                <a:ext cx="7046609" cy="197683"/>
+              </a:xfrm>
+              <a:prstGeom prst="rect">
+                <a:avLst/>
+              </a:prstGeom>
+              <a:blipFill>
+                <a:blip r:embed="rId5"/>
+                <a:stretch>
+                  <a:fillRect t="-6061" b="-33333"/>
+                </a:stretch>
+              </a:blipFill>
+            </p:spPr>
+            <p:txBody>
+              <a:bodyPr/>
+              <a:lstStyle/>
+              <a:p>
+                <a:r>
+                  <a:rPr lang="de-DE">
+                    <a:noFill/>
+                  </a:rPr>
+                  <a:t> </a:t>
+                </a:r>
+              </a:p>
+            </p:txBody>
+          </p:sp>
+        </mc:Fallback>
+      </mc:AlternateContent>
+    </p:spTree>
+    <p:extLst>
+      <p:ext uri="{BB962C8B-B14F-4D97-AF65-F5344CB8AC3E}">
+        <p14:creationId xmlns:p14="http://schemas.microsoft.com/office/powerpoint/2010/main" val="875314354"/>
+      </p:ext>
+    </p:extLst>
+  </p:cSld>
+  <p:clrMapOvr>
+    <a:masterClrMapping/>
+  </p:clrMapOvr>
+</p:sld>
+</file>
+
+<file path=ppt/tags/tag1.xml><?xml version="1.0" encoding="utf-8"?>
+<p:tagLst xmlns:a="http://schemas.openxmlformats.org/drawingml/2006/main" xmlns:r="http://schemas.openxmlformats.org/officeDocument/2006/relationships" xmlns:p="http://schemas.openxmlformats.org/presentationml/2006/main">
+  <p:tag name="THINKCELLSHAPEDONOTDELETE" val="thinkcellActiveDocDoNotDelete"/>
+</p:tagLst>
+</file>
+
+<file path=ppt/tags/tag2.xml><?xml version="1.0" encoding="utf-8"?>
+<p:tagLst xmlns:a="http://schemas.openxmlformats.org/drawingml/2006/main" xmlns:r="http://schemas.openxmlformats.org/officeDocument/2006/relationships" xmlns:p="http://schemas.openxmlformats.org/presentationml/2006/main">
+  <p:tag name="THINKCELLSHAPEDONOTDELETE" val="thinkcellActiveDocDoNotDelete"/>
+</p:tagLst>
 </file>
 
 <file path=ppt/theme/theme1.xml><?xml version="1.0" encoding="utf-8"?>

</xml_diff>

<commit_message>
Definition of terms to be added Fixes #11
</commit_message>
<xml_diff>
--- a/spec/Functions/diagrams/CategoriesOfFunctions.pptx
+++ b/spec/Functions/diagrams/CategoriesOfFunctions.pptx
@@ -198,7 +198,7 @@
           <a:p>
             <a:fld id="{37CCF725-7468-4D3D-9E24-A16745BBBA77}" type="datetimeFigureOut">
               <a:rPr lang="de-DE" smtClean="0"/>
-              <a:t>04.08.2025</a:t>
+              <a:t>05.08.2025</a:t>
             </a:fld>
             <a:endParaRPr lang="de-DE"/>
           </a:p>
@@ -596,7 +596,7 @@
           <a:p>
             <a:fld id="{9A2764DB-E7DF-4EA7-A1AF-05A77C280FCA}" type="datetimeFigureOut">
               <a:rPr lang="de-DE" smtClean="0"/>
-              <a:t>04.08.2025</a:t>
+              <a:t>05.08.2025</a:t>
             </a:fld>
             <a:endParaRPr lang="de-DE"/>
           </a:p>
@@ -766,7 +766,7 @@
           <a:p>
             <a:fld id="{9A2764DB-E7DF-4EA7-A1AF-05A77C280FCA}" type="datetimeFigureOut">
               <a:rPr lang="de-DE" smtClean="0"/>
-              <a:t>04.08.2025</a:t>
+              <a:t>05.08.2025</a:t>
             </a:fld>
             <a:endParaRPr lang="de-DE"/>
           </a:p>
@@ -946,7 +946,7 @@
           <a:p>
             <a:fld id="{9A2764DB-E7DF-4EA7-A1AF-05A77C280FCA}" type="datetimeFigureOut">
               <a:rPr lang="de-DE" smtClean="0"/>
-              <a:t>04.08.2025</a:t>
+              <a:t>05.08.2025</a:t>
             </a:fld>
             <a:endParaRPr lang="de-DE"/>
           </a:p>
@@ -1116,7 +1116,7 @@
           <a:p>
             <a:fld id="{9A2764DB-E7DF-4EA7-A1AF-05A77C280FCA}" type="datetimeFigureOut">
               <a:rPr lang="de-DE" smtClean="0"/>
-              <a:t>04.08.2025</a:t>
+              <a:t>05.08.2025</a:t>
             </a:fld>
             <a:endParaRPr lang="de-DE"/>
           </a:p>
@@ -1362,7 +1362,7 @@
           <a:p>
             <a:fld id="{9A2764DB-E7DF-4EA7-A1AF-05A77C280FCA}" type="datetimeFigureOut">
               <a:rPr lang="de-DE" smtClean="0"/>
-              <a:t>04.08.2025</a:t>
+              <a:t>05.08.2025</a:t>
             </a:fld>
             <a:endParaRPr lang="de-DE"/>
           </a:p>
@@ -1594,7 +1594,7 @@
           <a:p>
             <a:fld id="{9A2764DB-E7DF-4EA7-A1AF-05A77C280FCA}" type="datetimeFigureOut">
               <a:rPr lang="de-DE" smtClean="0"/>
-              <a:t>04.08.2025</a:t>
+              <a:t>05.08.2025</a:t>
             </a:fld>
             <a:endParaRPr lang="de-DE"/>
           </a:p>
@@ -1961,7 +1961,7 @@
           <a:p>
             <a:fld id="{9A2764DB-E7DF-4EA7-A1AF-05A77C280FCA}" type="datetimeFigureOut">
               <a:rPr lang="de-DE" smtClean="0"/>
-              <a:t>04.08.2025</a:t>
+              <a:t>05.08.2025</a:t>
             </a:fld>
             <a:endParaRPr lang="de-DE"/>
           </a:p>
@@ -2079,7 +2079,7 @@
           <a:p>
             <a:fld id="{9A2764DB-E7DF-4EA7-A1AF-05A77C280FCA}" type="datetimeFigureOut">
               <a:rPr lang="de-DE" smtClean="0"/>
-              <a:t>04.08.2025</a:t>
+              <a:t>05.08.2025</a:t>
             </a:fld>
             <a:endParaRPr lang="de-DE"/>
           </a:p>
@@ -2174,7 +2174,7 @@
           <a:p>
             <a:fld id="{9A2764DB-E7DF-4EA7-A1AF-05A77C280FCA}" type="datetimeFigureOut">
               <a:rPr lang="de-DE" smtClean="0"/>
-              <a:t>04.08.2025</a:t>
+              <a:t>05.08.2025</a:t>
             </a:fld>
             <a:endParaRPr lang="de-DE"/>
           </a:p>
@@ -2451,7 +2451,7 @@
           <a:p>
             <a:fld id="{9A2764DB-E7DF-4EA7-A1AF-05A77C280FCA}" type="datetimeFigureOut">
               <a:rPr lang="de-DE" smtClean="0"/>
-              <a:t>04.08.2025</a:t>
+              <a:t>05.08.2025</a:t>
             </a:fld>
             <a:endParaRPr lang="de-DE"/>
           </a:p>
@@ -2708,7 +2708,7 @@
           <a:p>
             <a:fld id="{9A2764DB-E7DF-4EA7-A1AF-05A77C280FCA}" type="datetimeFigureOut">
               <a:rPr lang="de-DE" smtClean="0"/>
-              <a:t>04.08.2025</a:t>
+              <a:t>05.08.2025</a:t>
             </a:fld>
             <a:endParaRPr lang="de-DE"/>
           </a:p>
@@ -2987,7 +2987,7 @@
           <a:p>
             <a:fld id="{9A2764DB-E7DF-4EA7-A1AF-05A77C280FCA}" type="datetimeFigureOut">
               <a:rPr lang="de-DE" smtClean="0"/>
-              <a:t>04.08.2025</a:t>
+              <a:t>05.08.2025</a:t>
             </a:fld>
             <a:endParaRPr lang="de-DE"/>
           </a:p>
@@ -6448,7 +6448,7 @@
             <p:spPr>
               <a:xfrm>
                 <a:off x="14184209" y="7505617"/>
-                <a:ext cx="7046609" cy="197683"/>
+                <a:ext cx="8036752" cy="197683"/>
               </a:xfrm>
               <a:prstGeom prst="rect">
                 <a:avLst/>
@@ -6461,6 +6461,7 @@
               </a:bodyPr>
               <a:lstStyle/>
               <a:p>
+                <a:pPr/>
                 <a14:m>
                   <m:oMathPara xmlns:m="http://schemas.openxmlformats.org/officeDocument/2006/math">
                     <m:oMathParaPr>
@@ -6470,7 +6471,9 @@
                       <m:sSup>
                         <m:sSupPr>
                           <m:ctrlPr>
-                            <a:rPr lang="pt-BR" sz="1200" smtClean="0"/>
+                            <a:rPr lang="pt-BR" sz="1200" i="1" smtClean="0">
+                              <a:latin typeface="Cambria Math" panose="02040503050406030204" pitchFamily="18" charset="0"/>
+                            </a:rPr>
                           </m:ctrlPr>
                         </m:sSupPr>
                         <m:e>
@@ -6479,7 +6482,9 @@
                               <m:begChr m:val="["/>
                               <m:endChr m:val="]"/>
                               <m:ctrlPr>
-                                <a:rPr lang="de-DE" sz="1200"/>
+                                <a:rPr lang="de-DE" sz="1200" i="1">
+                                  <a:latin typeface="Cambria Math" panose="02040503050406030204" pitchFamily="18" charset="0"/>
+                                </a:rPr>
                               </m:ctrlPr>
                             </m:dPr>
                             <m:e>
@@ -6487,162 +6492,225 @@
                                 <m:rPr>
                                   <m:sty m:val="p"/>
                                 </m:rPr>
-                                <a:rPr lang="pt-BR" sz="1200"/>
+                                <a:rPr lang="pt-BR" sz="1200">
+                                  <a:latin typeface="Cambria Math" panose="02040503050406030204" pitchFamily="18" charset="0"/>
+                                </a:rPr>
                                 <m:t>date</m:t>
                               </m:r>
                               <m:r>
-                                <a:rPr lang="pt-BR" sz="1200"/>
-                                <m:t>-</m:t>
+                                <a:rPr lang="pt-BR" sz="1200">
+                                  <a:latin typeface="Cambria Math" panose="02040503050406030204" pitchFamily="18" charset="0"/>
+                                </a:rPr>
+                                <m:t>−</m:t>
                               </m:r>
                               <m:r>
                                 <m:rPr>
                                   <m:sty m:val="p"/>
                                 </m:rPr>
-                                <a:rPr lang="pt-BR" sz="1200"/>
+                                <a:rPr lang="pt-BR" sz="1200">
+                                  <a:latin typeface="Cambria Math" panose="02040503050406030204" pitchFamily="18" charset="0"/>
+                                </a:rPr>
                                 <m:t>of</m:t>
                               </m:r>
                               <m:r>
-                                <a:rPr lang="pt-BR" sz="1200"/>
-                                <m:t>-</m:t>
+                                <a:rPr lang="pt-BR" sz="1200">
+                                  <a:latin typeface="Cambria Math" panose="02040503050406030204" pitchFamily="18" charset="0"/>
+                                </a:rPr>
+                                <m:t>−</m:t>
                               </m:r>
                               <m:r>
                                 <m:rPr>
                                   <m:sty m:val="p"/>
                                 </m:rPr>
-                                <a:rPr lang="pt-BR" sz="1200"/>
+                                <a:rPr lang="pt-BR" sz="1200">
+                                  <a:latin typeface="Cambria Math" panose="02040503050406030204" pitchFamily="18" charset="0"/>
+                                </a:rPr>
                                 <m:t>next</m:t>
                               </m:r>
                               <m:r>
-                                <a:rPr lang="pt-BR" sz="1200"/>
-                                <m:t>-</m:t>
+                                <a:rPr lang="pt-BR" sz="1200">
+                                  <a:latin typeface="Cambria Math" panose="02040503050406030204" pitchFamily="18" charset="0"/>
+                                </a:rPr>
+                                <m:t>−</m:t>
                               </m:r>
                               <m:r>
                                 <m:rPr>
                                   <m:sty m:val="p"/>
                                 </m:rPr>
-                                <a:rPr lang="pt-BR" sz="1200"/>
+                                <a:rPr lang="pt-BR" sz="1200">
+                                  <a:latin typeface="Cambria Math" panose="02040503050406030204" pitchFamily="18" charset="0"/>
+                                </a:rPr>
                                 <m:t>attempt</m:t>
                               </m:r>
                               <m:r>
-                                <a:rPr lang="pt-BR" sz="1200"/>
-                                <m:t>-</m:t>
+                                <a:rPr lang="pt-BR" sz="1200">
+                                  <a:latin typeface="Cambria Math" panose="02040503050406030204" pitchFamily="18" charset="0"/>
+                                </a:rPr>
+                                <m:t>−</m:t>
                               </m:r>
                               <m:r>
                                 <m:rPr>
                                   <m:sty m:val="p"/>
                                 </m:rPr>
-                                <a:rPr lang="pt-BR" sz="1200"/>
+                                <a:rPr lang="pt-BR" sz="1200">
+                                  <a:latin typeface="Cambria Math" panose="02040503050406030204" pitchFamily="18" charset="0"/>
+                                </a:rPr>
                                 <m:t>to</m:t>
                               </m:r>
                               <m:r>
-                                <a:rPr lang="pt-BR" sz="1200"/>
-                                <m:t>-</m:t>
+                                <a:rPr lang="pt-BR" sz="1200">
+                                  <a:latin typeface="Cambria Math" panose="02040503050406030204" pitchFamily="18" charset="0"/>
+                                </a:rPr>
+                                <m:t>−</m:t>
                               </m:r>
                               <m:r>
                                 <m:rPr>
                                   <m:sty m:val="p"/>
                                 </m:rPr>
-                                <a:rPr lang="pt-BR" sz="1200"/>
+                                <a:rPr lang="pt-BR" sz="1200">
+                                  <a:latin typeface="Cambria Math" panose="02040503050406030204" pitchFamily="18" charset="0"/>
+                                </a:rPr>
                                 <m:t>fix</m:t>
                               </m:r>
                             </m:e>
                           </m:d>
                           <m:r>
-                            <a:rPr lang="de-DE" sz="1200"/>
+                            <a:rPr lang="de-DE" sz="1200">
+                              <a:latin typeface="Cambria Math" panose="02040503050406030204" pitchFamily="18" charset="0"/>
+                            </a:rPr>
                             <m:t>=</m:t>
                           </m:r>
                           <m:r>
                             <m:rPr>
                               <m:sty m:val="p"/>
                             </m:rPr>
-                            <a:rPr lang="de-DE" sz="1200"/>
+                            <a:rPr lang="de-DE" sz="1200">
+                              <a:latin typeface="Cambria Math" panose="02040503050406030204" pitchFamily="18" charset="0"/>
+                            </a:rPr>
                             <m:t>max</m:t>
                           </m:r>
                           <m:r>
-                            <a:rPr lang="de-DE" sz="1200"/>
+                            <a:rPr lang="de-DE" sz="1200">
+                              <a:latin typeface="Cambria Math" panose="02040503050406030204" pitchFamily="18" charset="0"/>
+                            </a:rPr>
                             <m:t>([</m:t>
                           </m:r>
                           <m:r>
                             <m:rPr>
                               <m:sty m:val="p"/>
                             </m:rPr>
-                            <a:rPr lang="de-DE" sz="1200"/>
+                            <a:rPr lang="de-DE" sz="1200">
+                              <a:latin typeface="Cambria Math" panose="02040503050406030204" pitchFamily="18" charset="0"/>
+                            </a:rPr>
                             <m:t>date</m:t>
                           </m:r>
                           <m:r>
-                            <a:rPr lang="de-DE" sz="1200"/>
-                            <m:t>-</m:t>
+                            <a:rPr lang="de-DE" sz="1200">
+                              <a:latin typeface="Cambria Math" panose="02040503050406030204" pitchFamily="18" charset="0"/>
+                            </a:rPr>
+                            <m:t>−</m:t>
                           </m:r>
                           <m:r>
                             <m:rPr>
                               <m:sty m:val="p"/>
                             </m:rPr>
-                            <a:rPr lang="de-DE" sz="1200"/>
+                            <a:rPr lang="de-DE" sz="1200">
+                              <a:latin typeface="Cambria Math" panose="02040503050406030204" pitchFamily="18" charset="0"/>
+                            </a:rPr>
                             <m:t>of</m:t>
                           </m:r>
                           <m:r>
-                            <a:rPr lang="de-DE" sz="1200"/>
-                            <m:t>-</m:t>
+                            <a:rPr lang="de-DE" sz="1200">
+                              <a:latin typeface="Cambria Math" panose="02040503050406030204" pitchFamily="18" charset="0"/>
+                            </a:rPr>
+                            <m:t>−</m:t>
                           </m:r>
                           <m:r>
                             <m:rPr>
                               <m:sty m:val="p"/>
                             </m:rPr>
-                            <a:rPr lang="de-DE" sz="1200"/>
+                            <a:rPr lang="de-DE" sz="1200">
+                              <a:latin typeface="Cambria Math" panose="02040503050406030204" pitchFamily="18" charset="0"/>
+                            </a:rPr>
                             <m:t>attempt</m:t>
                           </m:r>
                           <m:r>
-                            <a:rPr lang="de-DE" sz="1200" b="0" i="0" smtClean="0"/>
+                            <a:rPr lang="de-DE" sz="1200" b="0" i="0" smtClean="0">
+                              <a:latin typeface="Cambria Math" panose="02040503050406030204" pitchFamily="18" charset="0"/>
+                            </a:rPr>
                             <m:t>]</m:t>
                           </m:r>
                           <m:r>
-                            <a:rPr lang="de-DE" sz="1200"/>
+                            <a:rPr lang="de-DE" sz="1200">
+                              <a:latin typeface="Cambria Math" panose="02040503050406030204" pitchFamily="18" charset="0"/>
+                            </a:rPr>
                             <m:t>)</m:t>
                           </m:r>
                           <m:r>
-                            <a:rPr lang="de-DE" sz="1200" i="1" smtClean="0"/>
+                            <a:rPr lang="de-DE" sz="1200" i="1" smtClean="0">
+                              <a:latin typeface="Cambria Math" panose="02040503050406030204" pitchFamily="18" charset="0"/>
+                            </a:rPr>
                             <m:t> </m:t>
                           </m:r>
                           <m:r>
-                            <a:rPr lang="de-DE" sz="1200"/>
+                            <a:rPr lang="de-DE" sz="1200">
+                              <a:latin typeface="Cambria Math" panose="02040503050406030204" pitchFamily="18" charset="0"/>
+                            </a:rPr>
                             <m:t>+</m:t>
                           </m:r>
                           <m:r>
                             <m:rPr>
                               <m:sty m:val="p"/>
                             </m:rPr>
-                            <a:rPr lang="de-DE" sz="1200"/>
+                            <a:rPr lang="de-DE" sz="1200">
+                              <a:latin typeface="Cambria Math" panose="02040503050406030204" pitchFamily="18" charset="0"/>
+                            </a:rPr>
                             <m:t>min</m:t>
                           </m:r>
                           <m:r>
-                            <a:rPr lang="de-DE" sz="1200"/>
+                            <a:rPr lang="de-DE" sz="1200">
+                              <a:latin typeface="Cambria Math" panose="02040503050406030204" pitchFamily="18" charset="0"/>
+                            </a:rPr>
                             <m:t>( [</m:t>
                           </m:r>
                           <m:r>
                             <m:rPr>
                               <m:sty m:val="p"/>
                             </m:rPr>
-                            <a:rPr lang="de-DE" sz="1200" b="0" i="0" smtClean="0"/>
-                            <m:t>tmi</m:t>
+                            <a:rPr lang="de-DE" sz="1200">
+                              <a:latin typeface="Cambria Math" panose="02040503050406030204" pitchFamily="18" charset="0"/>
+                            </a:rPr>
+                            <m:t>t</m:t>
                           </m:r>
                           <m:r>
                             <m:rPr>
                               <m:sty m:val="p"/>
                             </m:rPr>
-                            <a:rPr lang="de-DE" sz="1200" b="0" i="0" baseline="-25000" smtClean="0"/>
-                            <m:t>n</m:t>
+                            <a:rPr lang="de-DE" sz="1200" baseline="-25000">
+                              <a:latin typeface="Cambria Math" panose="02040503050406030204" pitchFamily="18" charset="0"/>
+                            </a:rPr>
+                            <m:t>m</m:t>
                           </m:r>
                           <m:r>
-                            <a:rPr lang="de-DE" sz="1200" b="0" i="0" smtClean="0"/>
+                            <m:rPr>
+                              <m:sty m:val="p"/>
+                            </m:rPr>
+                            <a:rPr lang="de-DE" sz="1200" b="0" i="0" baseline="-25000" smtClean="0">
+                              <a:latin typeface="Cambria Math" panose="02040503050406030204" pitchFamily="18" charset="0"/>
+                            </a:rPr>
+                            <m:t>in</m:t>
+                          </m:r>
+                          <m:r>
+                            <a:rPr lang="de-DE" sz="1200" b="0" i="0" smtClean="0">
+                              <a:latin typeface="Cambria Math" panose="02040503050406030204" pitchFamily="18" charset="0"/>
+                            </a:rPr>
                             <m:t>]</m:t>
                           </m:r>
                           <m:r>
-                            <a:rPr lang="de-DE" sz="1200"/>
-                            <m:t>∗</m:t>
-                          </m:r>
-                          <m:r>
-                            <a:rPr lang="de-DE" sz="1200"/>
-                            <m:t>2</m:t>
+                            <a:rPr lang="de-DE" sz="1200">
+                              <a:latin typeface="Cambria Math" panose="02040503050406030204" pitchFamily="18" charset="0"/>
+                            </a:rPr>
+                            <m:t>∗2</m:t>
                           </m:r>
                         </m:e>
                         <m:sup>
@@ -6650,7 +6718,9 @@
                             <m:rPr>
                               <m:sty m:val="p"/>
                             </m:rPr>
-                            <a:rPr lang="de-DE" sz="1200"/>
+                            <a:rPr lang="de-DE" sz="1200">
+                              <a:latin typeface="Cambria Math" panose="02040503050406030204" pitchFamily="18" charset="0"/>
+                            </a:rPr>
                             <m:t>count</m:t>
                           </m:r>
                           <m:r>
@@ -6664,7 +6734,7 @@
                               <m:begChr m:val="["/>
                               <m:endChr m:val="]"/>
                               <m:ctrlPr>
-                                <a:rPr lang="de-DE" sz="1200" b="0" i="0" smtClean="0">
+                                <a:rPr lang="de-DE" sz="1200" b="0" i="1" smtClean="0">
                                   <a:latin typeface="Cambria Math" panose="02040503050406030204" pitchFamily="18" charset="0"/>
                                 </a:rPr>
                               </m:ctrlPr>
@@ -6683,7 +6753,7 @@
                                 <a:rPr lang="de-DE" sz="1200">
                                   <a:latin typeface="Cambria Math" panose="02040503050406030204" pitchFamily="18" charset="0"/>
                                 </a:rPr>
-                                <m:t>-</m:t>
+                                <m:t>−</m:t>
                               </m:r>
                               <m:r>
                                 <m:rPr>
@@ -6698,7 +6768,7 @@
                                 <a:rPr lang="de-DE" sz="1200">
                                   <a:latin typeface="Cambria Math" panose="02040503050406030204" pitchFamily="18" charset="0"/>
                                 </a:rPr>
-                                <m:t>-</m:t>
+                                <m:t>−</m:t>
                               </m:r>
                               <m:r>
                                 <m:rPr>
@@ -6713,7 +6783,7 @@
                                 <a:rPr lang="de-DE" sz="1200">
                                   <a:latin typeface="Cambria Math" panose="02040503050406030204" pitchFamily="18" charset="0"/>
                                 </a:rPr>
-                                <m:t>-</m:t>
+                                <m:t>−</m:t>
                               </m:r>
                               <m:r>
                                 <m:rPr>
@@ -6733,7 +6803,9 @@
                             <m:t>)</m:t>
                           </m:r>
                           <m:r>
-                            <a:rPr lang="de-DE" sz="1200" i="1" smtClean="0"/>
+                            <a:rPr lang="de-DE" sz="1200" i="1" smtClean="0">
+                              <a:latin typeface="Cambria Math" panose="02040503050406030204" pitchFamily="18" charset="0"/>
+                            </a:rPr>
                             <m:t> </m:t>
                           </m:r>
                         </m:sup>
@@ -6749,7 +6821,7 @@
                           <m:begChr m:val="["/>
                           <m:endChr m:val="]"/>
                           <m:ctrlPr>
-                            <a:rPr lang="de-DE" sz="1200" b="0" i="0" smtClean="0">
+                            <a:rPr lang="de-DE" sz="1200" b="0" i="1" smtClean="0">
                               <a:latin typeface="Cambria Math" panose="02040503050406030204" pitchFamily="18" charset="0"/>
                             </a:rPr>
                           </m:ctrlPr>
@@ -6815,7 +6887,7 @@
             <p:spPr>
               <a:xfrm>
                 <a:off x="14184209" y="7505617"/>
-                <a:ext cx="7046609" cy="197683"/>
+                <a:ext cx="8036752" cy="197683"/>
               </a:xfrm>
               <a:prstGeom prst="rect">
                 <a:avLst/>

</xml_diff>